<commit_message>
new fireplan topdown view, updated 3d plotting axes labeels
</commit_message>
<xml_diff>
--- a/outputs/AFAC_2020/BNHCRC_Poster2020.pptx
+++ b/outputs/AFAC_2020/BNHCRC_Poster2020.pptx
@@ -1519,7 +1519,7 @@
         <p:spPr>
           <a:xfrm>
             <a:off x="-18720" y="0"/>
-            <a:ext cx="21401280" cy="9560520"/>
+            <a:ext cx="21400920" cy="9560160"/>
           </a:xfrm>
           <a:prstGeom prst="rect">
             <a:avLst/>
@@ -1560,7 +1560,7 @@
         <p:spPr>
           <a:xfrm>
             <a:off x="0" y="26790120"/>
-            <a:ext cx="21384720" cy="2876040"/>
+            <a:ext cx="21384360" cy="2875680"/>
           </a:xfrm>
           <a:prstGeom prst="rect">
             <a:avLst/>
@@ -1603,7 +1603,7 @@
         <p:spPr>
           <a:xfrm>
             <a:off x="0" y="29669760"/>
-            <a:ext cx="21382560" cy="604080"/>
+            <a:ext cx="21382200" cy="603720"/>
           </a:xfrm>
           <a:prstGeom prst="rect">
             <a:avLst/>
@@ -1644,7 +1644,7 @@
         <p:spPr>
           <a:xfrm>
             <a:off x="12490200" y="29667240"/>
-            <a:ext cx="8405280" cy="609840"/>
+            <a:ext cx="8404920" cy="609480"/>
           </a:xfrm>
           <a:prstGeom prst="rect">
             <a:avLst/>
@@ -1706,7 +1706,7 @@
         <p:spPr>
           <a:xfrm>
             <a:off x="2160360" y="720"/>
-            <a:ext cx="937440" cy="601920"/>
+            <a:ext cx="937080" cy="601560"/>
           </a:xfrm>
           <a:prstGeom prst="parallelogram">
             <a:avLst>
@@ -1749,7 +1749,7 @@
         <p:spPr>
           <a:xfrm>
             <a:off x="938880" y="720"/>
-            <a:ext cx="937440" cy="601920"/>
+            <a:ext cx="937080" cy="601560"/>
           </a:xfrm>
           <a:prstGeom prst="parallelogram">
             <a:avLst>
@@ -1792,7 +1792,7 @@
         <p:spPr>
           <a:xfrm>
             <a:off x="0" y="720"/>
-            <a:ext cx="632880" cy="601920"/>
+            <a:ext cx="632520" cy="601560"/>
           </a:xfrm>
           <a:custGeom>
             <a:avLst/>
@@ -1858,7 +1858,7 @@
         <p:spPr>
           <a:xfrm>
             <a:off x="3381840" y="720"/>
-            <a:ext cx="937440" cy="601920"/>
+            <a:ext cx="937080" cy="601560"/>
           </a:xfrm>
           <a:prstGeom prst="parallelogram">
             <a:avLst>
@@ -1901,7 +1901,7 @@
         <p:spPr>
           <a:xfrm>
             <a:off x="5824800" y="720"/>
-            <a:ext cx="937440" cy="601920"/>
+            <a:ext cx="937080" cy="601560"/>
           </a:xfrm>
           <a:prstGeom prst="parallelogram">
             <a:avLst>
@@ -1944,7 +1944,7 @@
         <p:spPr>
           <a:xfrm>
             <a:off x="4603320" y="720"/>
-            <a:ext cx="937440" cy="601920"/>
+            <a:ext cx="937080" cy="601560"/>
           </a:xfrm>
           <a:prstGeom prst="parallelogram">
             <a:avLst>
@@ -1987,7 +1987,7 @@
         <p:spPr>
           <a:xfrm>
             <a:off x="7046280" y="720"/>
-            <a:ext cx="937440" cy="601920"/>
+            <a:ext cx="937080" cy="601560"/>
           </a:xfrm>
           <a:prstGeom prst="parallelogram">
             <a:avLst>
@@ -2030,7 +2030,7 @@
         <p:spPr>
           <a:xfrm>
             <a:off x="9488880" y="720"/>
-            <a:ext cx="937440" cy="601920"/>
+            <a:ext cx="937080" cy="601560"/>
           </a:xfrm>
           <a:prstGeom prst="parallelogram">
             <a:avLst>
@@ -2073,7 +2073,7 @@
         <p:spPr>
           <a:xfrm>
             <a:off x="8267760" y="720"/>
-            <a:ext cx="937440" cy="601920"/>
+            <a:ext cx="937080" cy="601560"/>
           </a:xfrm>
           <a:prstGeom prst="parallelogram">
             <a:avLst>
@@ -2116,7 +2116,7 @@
         <p:spPr>
           <a:xfrm>
             <a:off x="10710360" y="720"/>
-            <a:ext cx="937440" cy="601920"/>
+            <a:ext cx="937080" cy="601560"/>
           </a:xfrm>
           <a:prstGeom prst="parallelogram">
             <a:avLst>
@@ -2159,7 +2159,7 @@
         <p:spPr>
           <a:xfrm>
             <a:off x="13153320" y="720"/>
-            <a:ext cx="937440" cy="601920"/>
+            <a:ext cx="937080" cy="601560"/>
           </a:xfrm>
           <a:prstGeom prst="parallelogram">
             <a:avLst>
@@ -2202,7 +2202,7 @@
         <p:spPr>
           <a:xfrm>
             <a:off x="11931840" y="720"/>
-            <a:ext cx="937440" cy="601920"/>
+            <a:ext cx="937080" cy="601560"/>
           </a:xfrm>
           <a:prstGeom prst="parallelogram">
             <a:avLst>
@@ -2285,7 +2285,7 @@
         <p:spPr>
           <a:xfrm>
             <a:off x="1413000" y="27623520"/>
-            <a:ext cx="5901120" cy="1205640"/>
+            <a:ext cx="5900760" cy="1205280"/>
           </a:xfrm>
           <a:prstGeom prst="rect">
             <a:avLst/>
@@ -2660,7 +2660,7 @@
         <p:spPr>
           <a:xfrm>
             <a:off x="1558080" y="3466440"/>
-            <a:ext cx="16811280" cy="4965480"/>
+            <a:ext cx="16810920" cy="4965120"/>
           </a:xfrm>
           <a:prstGeom prst="rect">
             <a:avLst/>
@@ -2685,7 +2685,7 @@
               </a:lnSpc>
             </a:pPr>
             <a:r>
-              <a:rPr b="1" lang="en-AU" sz="5400" spc="-1" strike="noStrike">
+              <a:rPr b="1" lang="en-AU" sz="6000" spc="-1" strike="noStrike">
                 <a:solidFill>
                   <a:srgbClr val="000000"/>
                 </a:solidFill>
@@ -2700,7 +2700,7 @@
               <a:t>Coupled modelling can provide the next level of value for fire danger forecasting</a:t>
             </a:r>
             <a:r>
-              <a:rPr b="0" lang="en-AU" sz="5400" spc="-1" strike="noStrike">
+              <a:rPr b="0" lang="en-AU" sz="6000" spc="-1" strike="noStrike">
                 <a:solidFill>
                   <a:srgbClr val="ffffff"/>
                 </a:solidFill>
@@ -2712,7 +2712,7 @@
                 <a:latin typeface="Century Gothic"/>
                 <a:ea typeface="DejaVu Sans"/>
               </a:rPr>
-              <a:t>, if it can be developed to the point where it is both faster than real time by enough to matter, and the underlying fuel loads are available in all high risk areas.</a:t>
+              <a:t>, if it can be developed to the point where it is both faster than real time by enough to matter, and good quality fuel data are available.</a:t>
             </a:r>
             <a:endParaRPr b="0" lang="en-AU" sz="1800" spc="-1" strike="noStrike">
               <a:solidFill>
@@ -2737,7 +2737,7 @@
         <p:spPr>
           <a:xfrm>
             <a:off x="14389560" y="16265880"/>
-            <a:ext cx="5398920" cy="333000"/>
+            <a:ext cx="5398560" cy="332640"/>
           </a:xfrm>
           <a:prstGeom prst="rect">
             <a:avLst/>
@@ -2774,7 +2774,7 @@
                 <a:latin typeface="Century Gothic"/>
                 <a:ea typeface="Cardo"/>
               </a:rPr>
-              <a:t>PCB near Waroona, 2016</a:t>
+              <a:t>PyroCB near Waroona, 2016</a:t>
             </a:r>
             <a:endParaRPr b="0" lang="en-AU" sz="1800" spc="-1" strike="noStrike">
               <a:solidFill>
@@ -2799,7 +2799,7 @@
         <p:spPr>
           <a:xfrm>
             <a:off x="1569240" y="15264000"/>
-            <a:ext cx="10500840" cy="9948240"/>
+            <a:ext cx="10500480" cy="9947880"/>
           </a:xfrm>
           <a:prstGeom prst="rect">
             <a:avLst/>
@@ -3004,7 +3004,7 @@
                 <a:latin typeface="Century Gothic"/>
                 <a:ea typeface="DejaVu Sans"/>
               </a:rPr>
-              <a:t>Pyrocumulonimbus (PCB)</a:t>
+              <a:t>Pyrocumulonimbus (PyroCB)</a:t>
             </a:r>
             <a:endParaRPr b="0" lang="en-AU" sz="1800" spc="-1" strike="noStrike">
               <a:solidFill>
@@ -3037,7 +3037,7 @@
                 <a:latin typeface="Century Gothic"/>
                 <a:ea typeface="DejaVu Sans"/>
               </a:rPr>
-              <a:t>The coupled model captured several PCB that were seen (e.g. top-right). These often cause strong surface winds and lightning, both of which lead to unexpected fire spread.</a:t>
+              <a:t>The coupled model captured several PyroCB that were seen (e.g. top-right). These often cause strong surface winds and lightning, both of which lead to unexpected fire spread.</a:t>
             </a:r>
             <a:endParaRPr b="0" lang="en-AU" sz="1800" spc="-1" strike="noStrike">
               <a:solidFill>
@@ -3088,22 +3088,7 @@
                 <a:latin typeface="Century Gothic"/>
                 <a:ea typeface="Cardo"/>
               </a:rPr>
-              <a:t>Figure 1: Top panel shows low level vertical motion, and the transect lines. Bottom panels show vertical motion along transects and cloud outlines (black li</a:t>
-            </a:r>
-            <a:r>
-              <a:rPr b="0" lang="en-AU" sz="1600" spc="-1" strike="noStrike">
-                <a:solidFill>
-                  <a:srgbClr val="000000"/>
-                </a:solidFill>
-                <a:uFill>
-                  <a:solidFill>
-                    <a:srgbClr val="ffffff"/>
-                  </a:solidFill>
-                </a:uFill>
-                <a:latin typeface="Century Gothic"/>
-                <a:ea typeface="Cardo"/>
-              </a:rPr>
-              <a:t>nes).</a:t>
+              <a:t>Figure 1: Top panel shows low level vertical motion, and the transect lines. Bottom panels show vertical motion along transects and cloud outlines (black lines).</a:t>
             </a:r>
             <a:endParaRPr b="0" lang="en-AU" sz="1800" spc="-1" strike="noStrike">
               <a:solidFill>
@@ -3271,7 +3256,7 @@
             </a:endParaRPr>
           </a:p>
           <a:p>
-            <a:pPr marL="285840" indent="-284760">
+            <a:pPr marL="285840" indent="-284400">
               <a:lnSpc>
                 <a:spcPct val="100000"/>
               </a:lnSpc>
@@ -3309,7 +3294,7 @@
             </a:endParaRPr>
           </a:p>
           <a:p>
-            <a:pPr marL="285840" indent="-284760">
+            <a:pPr marL="285840" indent="-284400">
               <a:lnSpc>
                 <a:spcPct val="100000"/>
               </a:lnSpc>
@@ -3347,7 +3332,7 @@
             </a:endParaRPr>
           </a:p>
           <a:p>
-            <a:pPr marL="285840" indent="-284760">
+            <a:pPr marL="285840" indent="-284400">
               <a:lnSpc>
                 <a:spcPct val="100000"/>
               </a:lnSpc>
@@ -3385,7 +3370,7 @@
             </a:endParaRPr>
           </a:p>
           <a:p>
-            <a:pPr marL="285840" indent="-284760">
+            <a:pPr marL="285840" indent="-284400">
               <a:lnSpc>
                 <a:spcPct val="100000"/>
               </a:lnSpc>
@@ -3408,7 +3393,7 @@
                 <a:latin typeface="Century Gothic"/>
                 <a:ea typeface="DejaVu Sans"/>
               </a:rPr>
-              <a:t>Modelling needs to be faster than real time to provide warning, the simulations in this work were faster but would require some more improvements.</a:t>
+              <a:t>We can now run these simulations in better than real time, allowing operational use.</a:t>
             </a:r>
             <a:endParaRPr b="0" lang="en-AU" sz="1800" spc="-1" strike="noStrike">
               <a:solidFill>
@@ -3433,7 +3418,7 @@
         <p:spPr>
           <a:xfrm>
             <a:off x="1631160" y="11602800"/>
-            <a:ext cx="10439280" cy="3943440"/>
+            <a:ext cx="10438920" cy="3943080"/>
           </a:xfrm>
           <a:prstGeom prst="rect">
             <a:avLst/>
@@ -3828,7 +3813,7 @@
         <p:spPr>
           <a:xfrm>
             <a:off x="1680480" y="2197080"/>
-            <a:ext cx="3040920" cy="870480"/>
+            <a:ext cx="3040560" cy="870120"/>
           </a:xfrm>
           <a:prstGeom prst="rect">
             <a:avLst/>
@@ -3869,7 +3854,7 @@
         <p:spPr>
           <a:xfrm>
             <a:off x="1747440" y="2334960"/>
-            <a:ext cx="3040920" cy="604080"/>
+            <a:ext cx="3040560" cy="603720"/>
           </a:xfrm>
           <a:prstGeom prst="rect">
             <a:avLst/>
@@ -3894,7 +3879,7 @@
               </a:lnSpc>
             </a:pPr>
             <a:r>
-              <a:rPr b="1" lang="en-AU" sz="3200" spc="593" strike="noStrike" cap="all">
+              <a:rPr b="1" lang="en-AU" sz="3200" spc="591" strike="noStrike" cap="all">
                 <a:solidFill>
                   <a:srgbClr val="ffffff"/>
                 </a:solidFill>
@@ -3931,7 +3916,7 @@
         <p:spPr>
           <a:xfrm>
             <a:off x="14389560" y="11602800"/>
-            <a:ext cx="5398920" cy="455400"/>
+            <a:ext cx="5398560" cy="455040"/>
           </a:xfrm>
           <a:prstGeom prst="rect">
             <a:avLst/>
@@ -3993,7 +3978,7 @@
         <p:spPr>
           <a:xfrm>
             <a:off x="14389560" y="21953880"/>
-            <a:ext cx="5398920" cy="576360"/>
+            <a:ext cx="5398560" cy="576000"/>
           </a:xfrm>
           <a:prstGeom prst="rect">
             <a:avLst/>
@@ -4055,7 +4040,7 @@
         <p:spPr>
           <a:xfrm>
             <a:off x="8285400" y="25488000"/>
-            <a:ext cx="4962600" cy="1337400"/>
+            <a:ext cx="4962240" cy="1337040"/>
           </a:xfrm>
           <a:prstGeom prst="rect">
             <a:avLst/>
@@ -4131,7 +4116,7 @@
         <p:spPr>
           <a:xfrm>
             <a:off x="14388840" y="12215160"/>
-            <a:ext cx="5986440" cy="3990240"/>
+            <a:ext cx="5986080" cy="3989880"/>
           </a:xfrm>
           <a:prstGeom prst="rect">
             <a:avLst/>
@@ -4154,7 +4139,7 @@
         <p:spPr>
           <a:xfrm>
             <a:off x="14400000" y="17280000"/>
-            <a:ext cx="6191640" cy="4370760"/>
+            <a:ext cx="6191280" cy="4370400"/>
           </a:xfrm>
           <a:prstGeom prst="rect">
             <a:avLst/>
@@ -4173,7 +4158,7 @@
         <p:spPr>
           <a:xfrm>
             <a:off x="14389560" y="25913880"/>
-            <a:ext cx="5398920" cy="576360"/>
+            <a:ext cx="5398560" cy="576000"/>
           </a:xfrm>
           <a:prstGeom prst="rect">
             <a:avLst/>

</xml_diff>